<commit_message>
Mise à jour du mode d'emploi et ajout de la présentation
</commit_message>
<xml_diff>
--- a/doc/PandemicClassroom - mode d'emploi.pptx
+++ b/doc/PandemicClassroom - mode d'emploi.pptx
@@ -117,6 +117,11 @@
       </a:defRPr>
     </a:lvl9pPr>
   </p:defaultTextStyle>
+  <p:extLst>
+    <p:ext uri="{EFAFB233-063F-42B5-8137-9DF3F51BA10A}">
+      <p15:sldGuideLst xmlns:p15="http://schemas.microsoft.com/office/powerpoint/2012/main"/>
+    </p:ext>
+  </p:extLst>
 </p:presentation>
 </file>
 
@@ -202,7 +207,7 @@
           <a:p>
             <a:fld id="{4DE99BD9-988D-4BA6-8268-AA39399AAC3C}" type="datetimeFigureOut">
               <a:rPr lang="fr-FR" smtClean="0"/>
-              <a:t>18/06/2020</a:t>
+              <a:t>19/06/2020</a:t>
             </a:fld>
             <a:endParaRPr lang="fr-FR"/>
           </a:p>
@@ -1456,7 +1461,7 @@
           <a:p>
             <a:fld id="{162C7C4D-AA8F-416F-B380-52AB7A8954C2}" type="datetimeFigureOut">
               <a:rPr lang="fr-FR" smtClean="0"/>
-              <a:t>18/06/2020</a:t>
+              <a:t>19/06/2020</a:t>
             </a:fld>
             <a:endParaRPr lang="fr-FR"/>
           </a:p>
@@ -1654,7 +1659,7 @@
           <a:p>
             <a:fld id="{162C7C4D-AA8F-416F-B380-52AB7A8954C2}" type="datetimeFigureOut">
               <a:rPr lang="fr-FR" smtClean="0"/>
-              <a:t>18/06/2020</a:t>
+              <a:t>19/06/2020</a:t>
             </a:fld>
             <a:endParaRPr lang="fr-FR"/>
           </a:p>
@@ -1862,7 +1867,7 @@
           <a:p>
             <a:fld id="{162C7C4D-AA8F-416F-B380-52AB7A8954C2}" type="datetimeFigureOut">
               <a:rPr lang="fr-FR" smtClean="0"/>
-              <a:t>18/06/2020</a:t>
+              <a:t>19/06/2020</a:t>
             </a:fld>
             <a:endParaRPr lang="fr-FR"/>
           </a:p>
@@ -2060,7 +2065,7 @@
           <a:p>
             <a:fld id="{162C7C4D-AA8F-416F-B380-52AB7A8954C2}" type="datetimeFigureOut">
               <a:rPr lang="fr-FR" smtClean="0"/>
-              <a:t>18/06/2020</a:t>
+              <a:t>19/06/2020</a:t>
             </a:fld>
             <a:endParaRPr lang="fr-FR"/>
           </a:p>
@@ -2335,7 +2340,7 @@
           <a:p>
             <a:fld id="{162C7C4D-AA8F-416F-B380-52AB7A8954C2}" type="datetimeFigureOut">
               <a:rPr lang="fr-FR" smtClean="0"/>
-              <a:t>18/06/2020</a:t>
+              <a:t>19/06/2020</a:t>
             </a:fld>
             <a:endParaRPr lang="fr-FR"/>
           </a:p>
@@ -2600,7 +2605,7 @@
           <a:p>
             <a:fld id="{162C7C4D-AA8F-416F-B380-52AB7A8954C2}" type="datetimeFigureOut">
               <a:rPr lang="fr-FR" smtClean="0"/>
-              <a:t>18/06/2020</a:t>
+              <a:t>19/06/2020</a:t>
             </a:fld>
             <a:endParaRPr lang="fr-FR"/>
           </a:p>
@@ -3012,7 +3017,7 @@
           <a:p>
             <a:fld id="{162C7C4D-AA8F-416F-B380-52AB7A8954C2}" type="datetimeFigureOut">
               <a:rPr lang="fr-FR" smtClean="0"/>
-              <a:t>18/06/2020</a:t>
+              <a:t>19/06/2020</a:t>
             </a:fld>
             <a:endParaRPr lang="fr-FR"/>
           </a:p>
@@ -3153,7 +3158,7 @@
           <a:p>
             <a:fld id="{162C7C4D-AA8F-416F-B380-52AB7A8954C2}" type="datetimeFigureOut">
               <a:rPr lang="fr-FR" smtClean="0"/>
-              <a:t>18/06/2020</a:t>
+              <a:t>19/06/2020</a:t>
             </a:fld>
             <a:endParaRPr lang="fr-FR"/>
           </a:p>
@@ -3266,7 +3271,7 @@
           <a:p>
             <a:fld id="{162C7C4D-AA8F-416F-B380-52AB7A8954C2}" type="datetimeFigureOut">
               <a:rPr lang="fr-FR" smtClean="0"/>
-              <a:t>18/06/2020</a:t>
+              <a:t>19/06/2020</a:t>
             </a:fld>
             <a:endParaRPr lang="fr-FR"/>
           </a:p>
@@ -3577,7 +3582,7 @@
           <a:p>
             <a:fld id="{162C7C4D-AA8F-416F-B380-52AB7A8954C2}" type="datetimeFigureOut">
               <a:rPr lang="fr-FR" smtClean="0"/>
-              <a:t>18/06/2020</a:t>
+              <a:t>19/06/2020</a:t>
             </a:fld>
             <a:endParaRPr lang="fr-FR"/>
           </a:p>
@@ -3865,7 +3870,7 @@
           <a:p>
             <a:fld id="{162C7C4D-AA8F-416F-B380-52AB7A8954C2}" type="datetimeFigureOut">
               <a:rPr lang="fr-FR" smtClean="0"/>
-              <a:t>18/06/2020</a:t>
+              <a:t>19/06/2020</a:t>
             </a:fld>
             <a:endParaRPr lang="fr-FR"/>
           </a:p>
@@ -4116,7 +4121,7 @@
           <a:p>
             <a:fld id="{162C7C4D-AA8F-416F-B380-52AB7A8954C2}" type="datetimeFigureOut">
               <a:rPr lang="fr-FR" smtClean="0"/>
-              <a:t>18/06/2020</a:t>
+              <a:t>19/06/2020</a:t>
             </a:fld>
             <a:endParaRPr lang="fr-FR"/>
           </a:p>
@@ -4547,7 +4552,7 @@
         </p:nvSpPr>
         <p:spPr>
           <a:xfrm>
-            <a:off x="544947" y="175539"/>
+            <a:off x="544946" y="2921168"/>
             <a:ext cx="11102107" cy="1015663"/>
           </a:xfrm>
           <a:prstGeom prst="rect">
@@ -4629,72 +4634,6 @@
           <a:chExt cx="0" cy="0"/>
         </a:xfrm>
       </p:grpSpPr>
-      <p:sp>
-        <p:nvSpPr>
-          <p:cNvPr id="3" name="ZoneTexte 2">
-            <a:extLst>
-              <a:ext uri="{FF2B5EF4-FFF2-40B4-BE49-F238E27FC236}">
-                <a16:creationId xmlns:a16="http://schemas.microsoft.com/office/drawing/2014/main" id="{2AEF704D-C391-4D15-B725-1AD5517322C4}"/>
-              </a:ext>
-            </a:extLst>
-          </p:cNvPr>
-          <p:cNvSpPr txBox="1"/>
-          <p:nvPr/>
-        </p:nvSpPr>
-        <p:spPr>
-          <a:xfrm>
-            <a:off x="544947" y="175539"/>
-            <a:ext cx="11102107" cy="1015663"/>
-          </a:xfrm>
-          <a:prstGeom prst="rect">
-            <a:avLst/>
-          </a:prstGeom>
-          <a:noFill/>
-        </p:spPr>
-        <p:txBody>
-          <a:bodyPr wrap="square" rtlCol="0">
-            <a:spAutoFit/>
-            <a:scene3d>
-              <a:camera prst="orthographicFront"/>
-              <a:lightRig rig="balanced" dir="t">
-                <a:rot lat="0" lon="0" rev="6000000"/>
-              </a:lightRig>
-            </a:scene3d>
-            <a:sp3d prstMaterial="matte"/>
-          </a:bodyPr>
-          <a:lstStyle/>
-          <a:p>
-            <a:pPr algn="ctr"/>
-            <a:r>
-              <a:rPr lang="fr-FR" sz="6000" dirty="0" err="1">
-                <a:solidFill>
-                  <a:srgbClr val="9BA9B0"/>
-                </a:solidFill>
-                <a:effectLst>
-                  <a:outerShdw dist="50800" dir="5400000" algn="t" rotWithShape="0">
-                    <a:srgbClr val="1F2F37"/>
-                  </a:outerShdw>
-                </a:effectLst>
-                <a:latin typeface="Pixellari" panose="02000603000000000000" pitchFamily="2" charset="0"/>
-                <a:ea typeface="Pixellari" panose="02000603000000000000" pitchFamily="2" charset="0"/>
-              </a:rPr>
-              <a:t>PandemicClassroom</a:t>
-            </a:r>
-            <a:endParaRPr lang="fr-FR" sz="6000" dirty="0">
-              <a:solidFill>
-                <a:srgbClr val="9BA9B0"/>
-              </a:solidFill>
-              <a:effectLst>
-                <a:outerShdw dist="50800" dir="5400000" algn="t" rotWithShape="0">
-                  <a:srgbClr val="1F2F37"/>
-                </a:outerShdw>
-              </a:effectLst>
-              <a:latin typeface="Pixellari" panose="02000603000000000000" pitchFamily="2" charset="0"/>
-              <a:ea typeface="Pixellari" panose="02000603000000000000" pitchFamily="2" charset="0"/>
-            </a:endParaRPr>
-          </a:p>
-        </p:txBody>
-      </p:sp>
       <p:pic>
         <p:nvPicPr>
           <p:cNvPr id="11" name="Image 10">
@@ -4751,7 +4690,7 @@
         </p:nvSpPr>
         <p:spPr>
           <a:xfrm>
-            <a:off x="6972300" y="1625596"/>
+            <a:off x="6977642" y="1859572"/>
             <a:ext cx="4674753" cy="4266462"/>
           </a:xfrm>
           <a:prstGeom prst="rect">
@@ -4810,7 +4749,27 @@
                 <a:latin typeface="Bahnschrift" panose="020B0502040204020203" pitchFamily="34" charset="0"/>
                 <a:ea typeface="Pixellari" panose="02000603000000000000" pitchFamily="2" charset="0"/>
               </a:rPr>
-              <a:t>Rappel sur ces plaques :</a:t>
+              <a:t>Rappel sur </a:t>
+            </a:r>
+            <a:r>
+              <a:rPr lang="fr-FR" sz="1600">
+                <a:solidFill>
+                  <a:srgbClr val="9BA9B0"/>
+                </a:solidFill>
+                <a:latin typeface="Bahnschrift" panose="020B0502040204020203" pitchFamily="34" charset="0"/>
+                <a:ea typeface="Pixellari" panose="02000603000000000000" pitchFamily="2" charset="0"/>
+              </a:rPr>
+              <a:t>ces plaques </a:t>
+            </a:r>
+            <a:r>
+              <a:rPr lang="fr-FR" sz="1600" dirty="0">
+                <a:solidFill>
+                  <a:srgbClr val="9BA9B0"/>
+                </a:solidFill>
+                <a:latin typeface="Bahnschrift" panose="020B0502040204020203" pitchFamily="34" charset="0"/>
+                <a:ea typeface="Pixellari" panose="02000603000000000000" pitchFamily="2" charset="0"/>
+              </a:rPr>
+              <a:t>:</a:t>
             </a:r>
           </a:p>
           <a:p>
@@ -4881,8 +4840,8 @@
           </a:p>
         </p:txBody>
       </p:sp>
-      <mc:AlternateContent xmlns:mc="http://schemas.openxmlformats.org/markup-compatibility/2006">
-        <mc:Choice xmlns:pslz="http://schemas.microsoft.com/office/powerpoint/2016/slidezoom" Requires="pslz">
+      <mc:AlternateContent xmlns:mc="http://schemas.openxmlformats.org/markup-compatibility/2006" xmlns:pslz="http://schemas.microsoft.com/office/powerpoint/2016/slidezoom">
+        <mc:Choice Requires="pslz">
           <p:graphicFrame>
             <p:nvGraphicFramePr>
               <p:cNvPr id="10" name="Zoom de diapositive 9">
@@ -4898,13 +4857,13 @@
               <p:nvPr>
                 <p:extLst>
                   <p:ext uri="{D42A27DB-BD31-4B8C-83A1-F6EECF244321}">
-                    <p14:modId xmlns:p14="http://schemas.microsoft.com/office/powerpoint/2010/main" val="4006699441"/>
+                    <p14:modId xmlns:p14="http://schemas.microsoft.com/office/powerpoint/2010/main" val="2016441139"/>
                   </p:ext>
                 </p:extLst>
               </p:nvPr>
             </p:nvGraphicFramePr>
             <p:xfrm>
-              <a:off x="8405385" y="3512124"/>
+              <a:off x="8405383" y="3754171"/>
               <a:ext cx="1819269" cy="1023339"/>
             </p:xfrm>
             <a:graphic>
@@ -4934,7 +4893,7 @@
             </a:graphic>
           </p:graphicFrame>
         </mc:Choice>
-        <mc:Fallback>
+        <mc:Fallback xmlns="">
           <p:pic>
             <p:nvPicPr>
               <p:cNvPr id="10" name="Zoom de diapositive 9">
@@ -4951,14 +4910,14 @@
               <p:nvPr/>
             </p:nvPicPr>
             <p:blipFill>
-              <a:blip r:embed="rId4"/>
+              <a:blip r:embed="rId6"/>
               <a:stretch>
                 <a:fillRect/>
               </a:stretch>
             </p:blipFill>
             <p:spPr>
               <a:xfrm>
-                <a:off x="8405385" y="3512124"/>
+                <a:off x="8405383" y="3754171"/>
                 <a:ext cx="1819269" cy="1023339"/>
               </a:xfrm>
               <a:prstGeom prst="rect">
@@ -4968,6 +4927,60 @@
           </p:pic>
         </mc:Fallback>
       </mc:AlternateContent>
+      <p:sp>
+        <p:nvSpPr>
+          <p:cNvPr id="6" name="ZoneTexte 5">
+            <a:extLst>
+              <a:ext uri="{FF2B5EF4-FFF2-40B4-BE49-F238E27FC236}">
+                <a16:creationId xmlns:a16="http://schemas.microsoft.com/office/drawing/2014/main" id="{5C5A5203-B016-4827-B87D-F7EB6355EB7D}"/>
+              </a:ext>
+            </a:extLst>
+          </p:cNvPr>
+          <p:cNvSpPr txBox="1"/>
+          <p:nvPr/>
+        </p:nvSpPr>
+        <p:spPr>
+          <a:xfrm>
+            <a:off x="544947" y="175539"/>
+            <a:ext cx="11102107" cy="1015663"/>
+          </a:xfrm>
+          <a:prstGeom prst="rect">
+            <a:avLst/>
+          </a:prstGeom>
+          <a:noFill/>
+        </p:spPr>
+        <p:txBody>
+          <a:bodyPr wrap="square" rtlCol="0">
+            <a:spAutoFit/>
+            <a:scene3d>
+              <a:camera prst="orthographicFront"/>
+              <a:lightRig rig="balanced" dir="t">
+                <a:rot lat="0" lon="0" rev="6000000"/>
+              </a:lightRig>
+            </a:scene3d>
+            <a:sp3d prstMaterial="matte"/>
+          </a:bodyPr>
+          <a:lstStyle/>
+          <a:p>
+            <a:pPr algn="ctr"/>
+            <a:r>
+              <a:rPr lang="fr-FR" sz="6000" dirty="0">
+                <a:solidFill>
+                  <a:srgbClr val="9BA9B0"/>
+                </a:solidFill>
+                <a:effectLst>
+                  <a:outerShdw dist="50800" dir="5400000" algn="t" rotWithShape="0">
+                    <a:srgbClr val="1F2F37"/>
+                  </a:outerShdw>
+                </a:effectLst>
+                <a:latin typeface="Pixellari" panose="02000603000000000000" pitchFamily="2" charset="0"/>
+                <a:ea typeface="Pixellari" panose="02000603000000000000" pitchFamily="2" charset="0"/>
+              </a:rPr>
+              <a:t>Mode d’emplois</a:t>
+            </a:r>
+          </a:p>
+        </p:txBody>
+      </p:sp>
     </p:spTree>
     <p:extLst>
       <p:ext uri="{BB962C8B-B14F-4D97-AF65-F5344CB8AC3E}">
@@ -4982,7 +4995,7 @@
 </file>
 
 <file path=ppt/slides/slide11.xml><?xml version="1.0" encoding="utf-8"?>
-<p:sld xmlns:a="http://schemas.openxmlformats.org/drawingml/2006/main" xmlns:r="http://schemas.openxmlformats.org/officeDocument/2006/relationships" xmlns:p="http://schemas.openxmlformats.org/presentationml/2006/main">
+<p:sld xmlns:a="http://schemas.openxmlformats.org/drawingml/2006/main" xmlns:r="http://schemas.openxmlformats.org/officeDocument/2006/relationships" xmlns:p="http://schemas.openxmlformats.org/presentationml/2006/main" show="0">
   <p:cSld>
     <p:spTree>
       <p:nvGrpSpPr>
@@ -5163,7 +5176,7 @@
         <p:spPr>
           <a:xfrm>
             <a:off x="993776" y="1849546"/>
-            <a:ext cx="9979024" cy="3497020"/>
+            <a:ext cx="9979024" cy="4112573"/>
           </a:xfrm>
           <a:prstGeom prst="rect">
             <a:avLst/>
@@ -5213,7 +5226,7 @@
                 <a:latin typeface="Bahnschrift" panose="020B0502040204020203" pitchFamily="34" charset="0"/>
                 <a:ea typeface="Pixellari" panose="02000603000000000000" pitchFamily="2" charset="0"/>
               </a:rPr>
-              <a:t>Une fois le jeu télécharger, vous devriez avoir une archive au format .zip.</a:t>
+              <a:t>Une fois le jeu téléchargé, vous devriez avoir une archive au format .zip accompagné de plusieurs fichiers au format .z0X.</a:t>
             </a:r>
             <a:br>
               <a:rPr lang="fr-FR" sz="2000" dirty="0">
@@ -5232,7 +5245,7 @@
                 <a:latin typeface="Bahnschrift" panose="020B0502040204020203" pitchFamily="34" charset="0"/>
                 <a:ea typeface="Pixellari" panose="02000603000000000000" pitchFamily="2" charset="0"/>
               </a:rPr>
-              <a:t>Décompressez-la avec un logiciel tel que </a:t>
+              <a:t>Avec un logiciel tel que </a:t>
             </a:r>
             <a:r>
               <a:rPr lang="fr-FR" sz="2000" dirty="0" err="1">
@@ -5272,7 +5285,7 @@
                 <a:latin typeface="Bahnschrift" panose="020B0502040204020203" pitchFamily="34" charset="0"/>
                 <a:ea typeface="Pixellari" panose="02000603000000000000" pitchFamily="2" charset="0"/>
               </a:rPr>
-              <a:t>.</a:t>
+              <a:t>, sélectionnez le .zip seul faite un clique droit, Extraite vers pour effectuer une décompression.</a:t>
             </a:r>
           </a:p>
           <a:p>
@@ -5308,27 +5321,7 @@
                 <a:latin typeface="Bahnschrift" panose="020B0502040204020203" pitchFamily="34" charset="0"/>
                 <a:ea typeface="Pixellari" panose="02000603000000000000" pitchFamily="2" charset="0"/>
               </a:rPr>
-              <a:t>   nw.exe dans le dossier </a:t>
-            </a:r>
-            <a:r>
-              <a:rPr lang="fr-FR" sz="2000" dirty="0" err="1">
-                <a:solidFill>
-                  <a:srgbClr val="9BA9B0"/>
-                </a:solidFill>
-                <a:latin typeface="Bahnschrift" panose="020B0502040204020203" pitchFamily="34" charset="0"/>
-                <a:ea typeface="Pixellari" panose="02000603000000000000" pitchFamily="2" charset="0"/>
-              </a:rPr>
-              <a:t>PandemicClassroom</a:t>
-            </a:r>
-            <a:r>
-              <a:rPr lang="fr-FR" sz="2000" dirty="0">
-                <a:solidFill>
-                  <a:srgbClr val="9BA9B0"/>
-                </a:solidFill>
-                <a:latin typeface="Bahnschrift" panose="020B0502040204020203" pitchFamily="34" charset="0"/>
-                <a:ea typeface="Pixellari" panose="02000603000000000000" pitchFamily="2" charset="0"/>
-              </a:rPr>
-              <a:t>(Win32) pour lancer le jeu.</a:t>
+              <a:t>   nw.exe dans le dossier (nommé Win32, Win64, ou osx64) pour lancer le jeu.</a:t>
             </a:r>
           </a:p>
           <a:p>
@@ -5380,7 +5373,7 @@
         </p:blipFill>
         <p:spPr>
           <a:xfrm>
-            <a:off x="7535503" y="3538204"/>
+            <a:off x="7535503" y="4129874"/>
             <a:ext cx="126131" cy="142875"/>
           </a:xfrm>
           <a:prstGeom prst="rect">
@@ -5419,7 +5412,7 @@
         </p:blipFill>
         <p:spPr>
           <a:xfrm>
-            <a:off x="6264684" y="4457517"/>
+            <a:off x="6264684" y="5049187"/>
             <a:ext cx="126131" cy="142875"/>
           </a:xfrm>
           <a:prstGeom prst="rect">
@@ -7391,72 +7384,6 @@
           <a:chExt cx="0" cy="0"/>
         </a:xfrm>
       </p:grpSpPr>
-      <p:sp>
-        <p:nvSpPr>
-          <p:cNvPr id="4" name="ZoneTexte 3">
-            <a:extLst>
-              <a:ext uri="{FF2B5EF4-FFF2-40B4-BE49-F238E27FC236}">
-                <a16:creationId xmlns:a16="http://schemas.microsoft.com/office/drawing/2014/main" id="{7EFC8A1B-A4BD-4B5B-B7EE-1FDA4E7F0810}"/>
-              </a:ext>
-            </a:extLst>
-          </p:cNvPr>
-          <p:cNvSpPr txBox="1"/>
-          <p:nvPr/>
-        </p:nvSpPr>
-        <p:spPr>
-          <a:xfrm>
-            <a:off x="544947" y="175539"/>
-            <a:ext cx="11102107" cy="1015663"/>
-          </a:xfrm>
-          <a:prstGeom prst="rect">
-            <a:avLst/>
-          </a:prstGeom>
-          <a:noFill/>
-        </p:spPr>
-        <p:txBody>
-          <a:bodyPr wrap="square" rtlCol="0">
-            <a:spAutoFit/>
-            <a:scene3d>
-              <a:camera prst="orthographicFront"/>
-              <a:lightRig rig="balanced" dir="t">
-                <a:rot lat="0" lon="0" rev="6000000"/>
-              </a:lightRig>
-            </a:scene3d>
-            <a:sp3d prstMaterial="matte"/>
-          </a:bodyPr>
-          <a:lstStyle/>
-          <a:p>
-            <a:pPr algn="ctr"/>
-            <a:r>
-              <a:rPr lang="fr-FR" sz="6000" dirty="0" err="1">
-                <a:solidFill>
-                  <a:srgbClr val="9BA9B0"/>
-                </a:solidFill>
-                <a:effectLst>
-                  <a:outerShdw dist="50800" dir="5400000" algn="t" rotWithShape="0">
-                    <a:srgbClr val="1F2F37"/>
-                  </a:outerShdw>
-                </a:effectLst>
-                <a:latin typeface="Pixellari" panose="02000603000000000000" pitchFamily="2" charset="0"/>
-                <a:ea typeface="Pixellari" panose="02000603000000000000" pitchFamily="2" charset="0"/>
-              </a:rPr>
-              <a:t>PandemicClassroom</a:t>
-            </a:r>
-            <a:endParaRPr lang="fr-FR" sz="6000" dirty="0">
-              <a:solidFill>
-                <a:srgbClr val="9BA9B0"/>
-              </a:solidFill>
-              <a:effectLst>
-                <a:outerShdw dist="50800" dir="5400000" algn="t" rotWithShape="0">
-                  <a:srgbClr val="1F2F37"/>
-                </a:outerShdw>
-              </a:effectLst>
-              <a:latin typeface="Pixellari" panose="02000603000000000000" pitchFamily="2" charset="0"/>
-              <a:ea typeface="Pixellari" panose="02000603000000000000" pitchFamily="2" charset="0"/>
-            </a:endParaRPr>
-          </a:p>
-        </p:txBody>
-      </p:sp>
       <p:pic>
         <p:nvPicPr>
           <p:cNvPr id="6" name="Image 5" descr="Une image contenant objet, dessin&#10;&#10;Description générée automatiquement">
@@ -7687,6 +7614,60 @@
                 <a:ea typeface="Pixellari" panose="02000603000000000000" pitchFamily="2" charset="0"/>
               </a:rPr>
               <a:t>1 2 3 4 5</a:t>
+            </a:r>
+          </a:p>
+        </p:txBody>
+      </p:sp>
+      <p:sp>
+        <p:nvSpPr>
+          <p:cNvPr id="8" name="ZoneTexte 7">
+            <a:extLst>
+              <a:ext uri="{FF2B5EF4-FFF2-40B4-BE49-F238E27FC236}">
+                <a16:creationId xmlns:a16="http://schemas.microsoft.com/office/drawing/2014/main" id="{B95F0A10-A7C7-41A0-AD60-6FD34992A3F0}"/>
+              </a:ext>
+            </a:extLst>
+          </p:cNvPr>
+          <p:cNvSpPr txBox="1"/>
+          <p:nvPr/>
+        </p:nvSpPr>
+        <p:spPr>
+          <a:xfrm>
+            <a:off x="544947" y="175539"/>
+            <a:ext cx="11102107" cy="1015663"/>
+          </a:xfrm>
+          <a:prstGeom prst="rect">
+            <a:avLst/>
+          </a:prstGeom>
+          <a:noFill/>
+        </p:spPr>
+        <p:txBody>
+          <a:bodyPr wrap="square" rtlCol="0">
+            <a:spAutoFit/>
+            <a:scene3d>
+              <a:camera prst="orthographicFront"/>
+              <a:lightRig rig="balanced" dir="t">
+                <a:rot lat="0" lon="0" rev="6000000"/>
+              </a:lightRig>
+            </a:scene3d>
+            <a:sp3d prstMaterial="matte"/>
+          </a:bodyPr>
+          <a:lstStyle/>
+          <a:p>
+            <a:pPr algn="ctr"/>
+            <a:r>
+              <a:rPr lang="fr-FR" sz="6000" dirty="0">
+                <a:solidFill>
+                  <a:srgbClr val="9BA9B0"/>
+                </a:solidFill>
+                <a:effectLst>
+                  <a:outerShdw dist="50800" dir="5400000" algn="t" rotWithShape="0">
+                    <a:srgbClr val="1F2F37"/>
+                  </a:outerShdw>
+                </a:effectLst>
+                <a:latin typeface="Pixellari" panose="02000603000000000000" pitchFamily="2" charset="0"/>
+                <a:ea typeface="Pixellari" panose="02000603000000000000" pitchFamily="2" charset="0"/>
+              </a:rPr>
+              <a:t>Mode d’emplois</a:t>
             </a:r>
           </a:p>
         </p:txBody>
@@ -7721,72 +7702,6 @@
           <a:chExt cx="0" cy="0"/>
         </a:xfrm>
       </p:grpSpPr>
-      <p:sp>
-        <p:nvSpPr>
-          <p:cNvPr id="3" name="ZoneTexte 2">
-            <a:extLst>
-              <a:ext uri="{FF2B5EF4-FFF2-40B4-BE49-F238E27FC236}">
-                <a16:creationId xmlns:a16="http://schemas.microsoft.com/office/drawing/2014/main" id="{2AEF704D-C391-4D15-B725-1AD5517322C4}"/>
-              </a:ext>
-            </a:extLst>
-          </p:cNvPr>
-          <p:cNvSpPr txBox="1"/>
-          <p:nvPr/>
-        </p:nvSpPr>
-        <p:spPr>
-          <a:xfrm>
-            <a:off x="544947" y="175539"/>
-            <a:ext cx="11102107" cy="1015663"/>
-          </a:xfrm>
-          <a:prstGeom prst="rect">
-            <a:avLst/>
-          </a:prstGeom>
-          <a:noFill/>
-        </p:spPr>
-        <p:txBody>
-          <a:bodyPr wrap="square" rtlCol="0">
-            <a:spAutoFit/>
-            <a:scene3d>
-              <a:camera prst="orthographicFront"/>
-              <a:lightRig rig="balanced" dir="t">
-                <a:rot lat="0" lon="0" rev="6000000"/>
-              </a:lightRig>
-            </a:scene3d>
-            <a:sp3d prstMaterial="matte"/>
-          </a:bodyPr>
-          <a:lstStyle/>
-          <a:p>
-            <a:pPr algn="ctr"/>
-            <a:r>
-              <a:rPr lang="fr-FR" sz="6000" dirty="0" err="1">
-                <a:solidFill>
-                  <a:srgbClr val="9BA9B0"/>
-                </a:solidFill>
-                <a:effectLst>
-                  <a:outerShdw dist="50800" dir="5400000" algn="t" rotWithShape="0">
-                    <a:srgbClr val="1F2F37"/>
-                  </a:outerShdw>
-                </a:effectLst>
-                <a:latin typeface="Pixellari" panose="02000603000000000000" pitchFamily="2" charset="0"/>
-                <a:ea typeface="Pixellari" panose="02000603000000000000" pitchFamily="2" charset="0"/>
-              </a:rPr>
-              <a:t>PandemicClassroom</a:t>
-            </a:r>
-            <a:endParaRPr lang="fr-FR" sz="6000" dirty="0">
-              <a:solidFill>
-                <a:srgbClr val="9BA9B0"/>
-              </a:solidFill>
-              <a:effectLst>
-                <a:outerShdw dist="50800" dir="5400000" algn="t" rotWithShape="0">
-                  <a:srgbClr val="1F2F37"/>
-                </a:outerShdw>
-              </a:effectLst>
-              <a:latin typeface="Pixellari" panose="02000603000000000000" pitchFamily="2" charset="0"/>
-              <a:ea typeface="Pixellari" panose="02000603000000000000" pitchFamily="2" charset="0"/>
-            </a:endParaRPr>
-          </a:p>
-        </p:txBody>
-      </p:sp>
       <p:pic>
         <p:nvPicPr>
           <p:cNvPr id="15" name="Image 14">
@@ -7945,6 +7860,60 @@
                 <a:ea typeface="Pixellari" panose="02000603000000000000" pitchFamily="2" charset="0"/>
               </a:rPr>
               <a:t>(Non fonctionnel dans la version actuelle)</a:t>
+            </a:r>
+          </a:p>
+        </p:txBody>
+      </p:sp>
+      <p:sp>
+        <p:nvSpPr>
+          <p:cNvPr id="5" name="ZoneTexte 4">
+            <a:extLst>
+              <a:ext uri="{FF2B5EF4-FFF2-40B4-BE49-F238E27FC236}">
+                <a16:creationId xmlns:a16="http://schemas.microsoft.com/office/drawing/2014/main" id="{34203DCB-570E-4883-AA26-D540DC1C0A8C}"/>
+              </a:ext>
+            </a:extLst>
+          </p:cNvPr>
+          <p:cNvSpPr txBox="1"/>
+          <p:nvPr/>
+        </p:nvSpPr>
+        <p:spPr>
+          <a:xfrm>
+            <a:off x="544947" y="175539"/>
+            <a:ext cx="11102107" cy="1015663"/>
+          </a:xfrm>
+          <a:prstGeom prst="rect">
+            <a:avLst/>
+          </a:prstGeom>
+          <a:noFill/>
+        </p:spPr>
+        <p:txBody>
+          <a:bodyPr wrap="square" rtlCol="0">
+            <a:spAutoFit/>
+            <a:scene3d>
+              <a:camera prst="orthographicFront"/>
+              <a:lightRig rig="balanced" dir="t">
+                <a:rot lat="0" lon="0" rev="6000000"/>
+              </a:lightRig>
+            </a:scene3d>
+            <a:sp3d prstMaterial="matte"/>
+          </a:bodyPr>
+          <a:lstStyle/>
+          <a:p>
+            <a:pPr algn="ctr"/>
+            <a:r>
+              <a:rPr lang="fr-FR" sz="6000" dirty="0">
+                <a:solidFill>
+                  <a:srgbClr val="9BA9B0"/>
+                </a:solidFill>
+                <a:effectLst>
+                  <a:outerShdw dist="50800" dir="5400000" algn="t" rotWithShape="0">
+                    <a:srgbClr val="1F2F37"/>
+                  </a:outerShdw>
+                </a:effectLst>
+                <a:latin typeface="Pixellari" panose="02000603000000000000" pitchFamily="2" charset="0"/>
+                <a:ea typeface="Pixellari" panose="02000603000000000000" pitchFamily="2" charset="0"/>
+              </a:rPr>
+              <a:t>Mode d’emplois</a:t>
             </a:r>
           </a:p>
         </p:txBody>

</xml_diff>